<commit_message>
updates to first three lectures
</commit_message>
<xml_diff>
--- a/lectures/2-ML-Overview.pptx
+++ b/lectures/2-ML-Overview.pptx
@@ -18609,11 +18609,7 @@
             </a:r>
             <a:r>
               <a:rPr lang="en-US" sz="3200" dirty="0"/>
-              <a:t>From data points, predict continuous valued </a:t>
-            </a:r>
-            <a:r>
-              <a:rPr lang="en-US" sz="3200"/>
-              <a:t>outputs.</a:t>
+              <a:t>From data points, predict continuous valued outputs.</a:t>
             </a:r>
           </a:p>
           <a:p>
@@ -19618,7 +19614,7 @@
         <p:spPr bwMode="auto">
           <a:xfrm>
             <a:off x="6096000" y="3145602"/>
-            <a:ext cx="4091924" cy="1446550"/>
+            <a:ext cx="4091924" cy="1785104"/>
           </a:xfrm>
           <a:prstGeom prst="rect">
             <a:avLst/>
@@ -19772,7 +19768,7 @@
                   <a:srgbClr val="000000"/>
                 </a:solidFill>
               </a:rPr>
-              <a:t>independent variables</a:t>
+              <a:t>independent variables/covariates</a:t>
             </a:r>
           </a:p>
           <a:p>
@@ -21408,7 +21404,7 @@
         </p:nvSpPr>
         <p:spPr>
           <a:xfrm>
-            <a:off x="4596549" y="1678426"/>
+            <a:off x="4624258" y="1380387"/>
             <a:ext cx="3444214" cy="646331"/>
           </a:xfrm>
           <a:prstGeom prst="rect">

</xml_diff>